<commit_message>
corriginfo formulas de custo da regressao logistica, do SVM e adicionando hipotese
</commit_message>
<xml_diff>
--- a/presentation/PresentationSVM.pptx
+++ b/presentation/PresentationSVM.pptx
@@ -10,16 +10,17 @@
     <p:sldId id="264" r:id="rId4"/>
     <p:sldId id="265" r:id="rId5"/>
     <p:sldId id="266" r:id="rId6"/>
-    <p:sldId id="258" r:id="rId7"/>
-    <p:sldId id="267" r:id="rId8"/>
-    <p:sldId id="259" r:id="rId9"/>
-    <p:sldId id="260" r:id="rId10"/>
-    <p:sldId id="269" r:id="rId11"/>
-    <p:sldId id="261" r:id="rId12"/>
-    <p:sldId id="262" r:id="rId13"/>
-    <p:sldId id="268" r:id="rId14"/>
-    <p:sldId id="270" r:id="rId15"/>
-    <p:sldId id="271" r:id="rId16"/>
+    <p:sldId id="272" r:id="rId7"/>
+    <p:sldId id="258" r:id="rId8"/>
+    <p:sldId id="267" r:id="rId9"/>
+    <p:sldId id="259" r:id="rId10"/>
+    <p:sldId id="260" r:id="rId11"/>
+    <p:sldId id="269" r:id="rId12"/>
+    <p:sldId id="261" r:id="rId13"/>
+    <p:sldId id="262" r:id="rId14"/>
+    <p:sldId id="268" r:id="rId15"/>
+    <p:sldId id="270" r:id="rId16"/>
+    <p:sldId id="271" r:id="rId17"/>
   </p:sldIdLst>
   <p:sldSz cx="12192000" cy="6858000"/>
   <p:notesSz cx="6858000" cy="9144000"/>
@@ -3440,6 +3441,133 @@
           <p:cNvPr id="2" name="Title 1">
             <a:extLst>
               <a:ext uri="{FF2B5EF4-FFF2-40B4-BE49-F238E27FC236}">
+                <a16:creationId xmlns:a16="http://schemas.microsoft.com/office/drawing/2014/main" id="{8E094BEA-C5E1-4345-B805-A1ADFC0F5B56}"/>
+              </a:ext>
+            </a:extLst>
+          </p:cNvPr>
+          <p:cNvSpPr>
+            <a:spLocks noGrp="1"/>
+          </p:cNvSpPr>
+          <p:nvPr>
+            <p:ph type="title"/>
+          </p:nvPr>
+        </p:nvSpPr>
+        <p:spPr/>
+        <p:txBody>
+          <a:bodyPr/>
+          <a:lstStyle/>
+          <a:p>
+            <a:r>
+              <a:rPr lang="en-US" dirty="0"/>
+              <a:t>O que </a:t>
+            </a:r>
+            <a:r>
+              <a:rPr lang="en-US" dirty="0" err="1"/>
+              <a:t>é</a:t>
+            </a:r>
+            <a:r>
+              <a:rPr lang="en-US" dirty="0"/>
+              <a:t> soft margin? </a:t>
+            </a:r>
+            <a:r>
+              <a:rPr lang="en-US" dirty="0" err="1"/>
+              <a:t>Por</a:t>
+            </a:r>
+            <a:r>
+              <a:rPr lang="en-US" dirty="0"/>
+              <a:t> que </a:t>
+            </a:r>
+            <a:r>
+              <a:rPr lang="en-US" dirty="0" err="1"/>
+              <a:t>ele</a:t>
+            </a:r>
+            <a:r>
+              <a:rPr lang="en-US" dirty="0"/>
+              <a:t> </a:t>
+            </a:r>
+            <a:r>
+              <a:rPr lang="en-US" dirty="0" err="1"/>
+              <a:t>foi</a:t>
+            </a:r>
+            <a:r>
+              <a:rPr lang="en-US" dirty="0"/>
+              <a:t> </a:t>
+            </a:r>
+            <a:r>
+              <a:rPr lang="en-US" dirty="0" err="1"/>
+              <a:t>criado</a:t>
+            </a:r>
+            <a:r>
+              <a:rPr lang="en-US" dirty="0"/>
+              <a:t>?</a:t>
+            </a:r>
+          </a:p>
+        </p:txBody>
+      </p:sp>
+      <p:pic>
+        <p:nvPicPr>
+          <p:cNvPr id="5" name="Content Placeholder 4">
+            <a:extLst>
+              <a:ext uri="{FF2B5EF4-FFF2-40B4-BE49-F238E27FC236}">
+                <a16:creationId xmlns:a16="http://schemas.microsoft.com/office/drawing/2014/main" id="{5BDD7081-1B0A-0543-B27A-AECBB3842C5D}"/>
+              </a:ext>
+            </a:extLst>
+          </p:cNvPr>
+          <p:cNvPicPr>
+            <a:picLocks noGrp="1" noChangeAspect="1"/>
+          </p:cNvPicPr>
+          <p:nvPr>
+            <p:ph idx="1"/>
+          </p:nvPr>
+        </p:nvPicPr>
+        <p:blipFill>
+          <a:blip r:embed="rId2"/>
+          <a:stretch>
+            <a:fillRect/>
+          </a:stretch>
+        </p:blipFill>
+        <p:spPr>
+          <a:xfrm>
+            <a:off x="2504904" y="1562154"/>
+            <a:ext cx="5756348" cy="4351338"/>
+          </a:xfrm>
+        </p:spPr>
+      </p:pic>
+    </p:spTree>
+    <p:extLst>
+      <p:ext uri="{BB962C8B-B14F-4D97-AF65-F5344CB8AC3E}">
+        <p14:creationId xmlns:p14="http://schemas.microsoft.com/office/powerpoint/2010/main" val="1917038832"/>
+      </p:ext>
+    </p:extLst>
+  </p:cSld>
+  <p:clrMapOvr>
+    <a:masterClrMapping/>
+  </p:clrMapOvr>
+</p:sld>
+</file>
+
+<file path=ppt/slides/slide11.xml><?xml version="1.0" encoding="utf-8"?>
+<p:sld xmlns:a="http://schemas.openxmlformats.org/drawingml/2006/main" xmlns:r="http://schemas.openxmlformats.org/officeDocument/2006/relationships" xmlns:p="http://schemas.openxmlformats.org/presentationml/2006/main">
+  <p:cSld>
+    <p:spTree>
+      <p:nvGrpSpPr>
+        <p:cNvPr id="1" name=""/>
+        <p:cNvGrpSpPr/>
+        <p:nvPr/>
+      </p:nvGrpSpPr>
+      <p:grpSpPr>
+        <a:xfrm>
+          <a:off x="0" y="0"/>
+          <a:ext cx="0" cy="0"/>
+          <a:chOff x="0" y="0"/>
+          <a:chExt cx="0" cy="0"/>
+        </a:xfrm>
+      </p:grpSpPr>
+      <p:sp>
+        <p:nvSpPr>
+          <p:cNvPr id="2" name="Title 1">
+            <a:extLst>
+              <a:ext uri="{FF2B5EF4-FFF2-40B4-BE49-F238E27FC236}">
                 <a16:creationId xmlns:a16="http://schemas.microsoft.com/office/drawing/2014/main" id="{04631465-834B-F142-AA06-9ACF941B52E4}"/>
               </a:ext>
             </a:extLst>
@@ -3535,7 +3663,7 @@
 </p:sld>
 </file>
 
-<file path=ppt/slides/slide11.xml><?xml version="1.0" encoding="utf-8"?>
+<file path=ppt/slides/slide12.xml><?xml version="1.0" encoding="utf-8"?>
 <p:sld xmlns:a="http://schemas.openxmlformats.org/drawingml/2006/main" xmlns:r="http://schemas.openxmlformats.org/officeDocument/2006/relationships" xmlns:p="http://schemas.openxmlformats.org/presentationml/2006/main">
   <p:cSld>
     <p:spTree>
@@ -3644,7 +3772,7 @@
 </p:sld>
 </file>
 
-<file path=ppt/slides/slide12.xml><?xml version="1.0" encoding="utf-8"?>
+<file path=ppt/slides/slide13.xml><?xml version="1.0" encoding="utf-8"?>
 <p:sld xmlns:a="http://schemas.openxmlformats.org/drawingml/2006/main" xmlns:r="http://schemas.openxmlformats.org/officeDocument/2006/relationships" xmlns:p="http://schemas.openxmlformats.org/presentationml/2006/main">
   <p:cSld>
     <p:spTree>
@@ -3842,7 +3970,7 @@
 </p:sld>
 </file>
 
-<file path=ppt/slides/slide13.xml><?xml version="1.0" encoding="utf-8"?>
+<file path=ppt/slides/slide14.xml><?xml version="1.0" encoding="utf-8"?>
 <p:sld xmlns:a="http://schemas.openxmlformats.org/drawingml/2006/main" xmlns:r="http://schemas.openxmlformats.org/officeDocument/2006/relationships" xmlns:p="http://schemas.openxmlformats.org/presentationml/2006/main">
   <p:cSld>
     <p:spTree>
@@ -3933,7 +4061,7 @@
 </p:sld>
 </file>
 
-<file path=ppt/slides/slide14.xml><?xml version="1.0" encoding="utf-8"?>
+<file path=ppt/slides/slide15.xml><?xml version="1.0" encoding="utf-8"?>
 <p:sld xmlns:a="http://schemas.openxmlformats.org/drawingml/2006/main" xmlns:r="http://schemas.openxmlformats.org/officeDocument/2006/relationships" xmlns:p="http://schemas.openxmlformats.org/presentationml/2006/main">
   <p:cSld>
     <p:spTree>
@@ -3977,8 +4105,13 @@
             </a:r>
             <a:r>
               <a:rPr lang="en-US" dirty="0"/>
-              <a:t> multiclass</a:t>
-            </a:r>
+              <a:t> </a:t>
+            </a:r>
+            <a:r>
+              <a:rPr lang="en-US" dirty="0" err="1"/>
+              <a:t>multiclasse</a:t>
+            </a:r>
+            <a:endParaRPr lang="en-US" dirty="0"/>
           </a:p>
         </p:txBody>
       </p:sp>
@@ -4024,7 +4157,7 @@
 </p:sld>
 </file>
 
-<file path=ppt/slides/slide15.xml><?xml version="1.0" encoding="utf-8"?>
+<file path=ppt/slides/slide16.xml><?xml version="1.0" encoding="utf-8"?>
 <p:sld xmlns:a="http://schemas.openxmlformats.org/drawingml/2006/main" xmlns:r="http://schemas.openxmlformats.org/officeDocument/2006/relationships" xmlns:p="http://schemas.openxmlformats.org/presentationml/2006/main">
   <p:cSld>
     <p:spTree>
@@ -4266,7 +4399,7 @@
             <p:spPr>
               <a:xfrm>
                 <a:off x="1441341" y="2309247"/>
-                <a:ext cx="3270143" cy="790345"/>
+                <a:ext cx="3270143" cy="862095"/>
               </a:xfrm>
               <a:prstGeom prst="rect">
                 <a:avLst/>
@@ -4314,7 +4447,7 @@
                     <a:latin typeface="Cambria Math" panose="02040503050406030204" pitchFamily="18" charset="0"/>
                     <a:ea typeface="Cambria Math" panose="02040503050406030204" pitchFamily="18" charset="0"/>
                   </a:rPr>
-                  <a:t>(z) </a:t>
+                  <a:t>(x) </a:t>
                 </a:r>
                 <a:r>
                   <a:rPr lang="en-US" sz="3200" dirty="0"/>
@@ -4368,11 +4501,37 @@
                               </a:rPr>
                               <m:t>−</m:t>
                             </m:r>
+                            <m:sSup>
+                              <m:sSupPr>
+                                <m:ctrlPr>
+                                  <a:rPr lang="en-US" sz="3200" b="0" i="1" smtClean="0">
+                                    <a:latin typeface="Cambria Math" panose="02040503050406030204" pitchFamily="18" charset="0"/>
+                                  </a:rPr>
+                                </m:ctrlPr>
+                              </m:sSupPr>
+                              <m:e>
+                                <m:r>
+                                  <a:rPr lang="en-US" sz="3200" b="0" i="1" smtClean="0">
+                                    <a:latin typeface="Cambria Math" panose="02040503050406030204" pitchFamily="18" charset="0"/>
+                                    <a:ea typeface="Cambria Math" panose="02040503050406030204" pitchFamily="18" charset="0"/>
+                                  </a:rPr>
+                                  <m:t>𝜃</m:t>
+                                </m:r>
+                              </m:e>
+                              <m:sup>
+                                <m:r>
+                                  <a:rPr lang="en-US" sz="3200" b="0" i="1" smtClean="0">
+                                    <a:latin typeface="Cambria Math" panose="02040503050406030204" pitchFamily="18" charset="0"/>
+                                  </a:rPr>
+                                  <m:t>𝑇</m:t>
+                                </m:r>
+                              </m:sup>
+                            </m:sSup>
                             <m:r>
                               <a:rPr lang="en-US" sz="3200" b="0" i="1" smtClean="0">
                                 <a:latin typeface="Cambria Math" panose="02040503050406030204" pitchFamily="18" charset="0"/>
                               </a:rPr>
-                              <m:t>𝑧</m:t>
+                              <m:t>𝑋</m:t>
                             </m:r>
                           </m:sup>
                         </m:sSup>
@@ -4403,7 +4562,7 @@
             <p:spPr>
               <a:xfrm>
                 <a:off x="1441341" y="2309247"/>
-                <a:ext cx="3270143" cy="790345"/>
+                <a:ext cx="3270143" cy="862095"/>
               </a:xfrm>
               <a:prstGeom prst="rect">
                 <a:avLst/>
@@ -4411,136 +4570,7 @@
               <a:blipFill>
                 <a:blip r:embed="rId3"/>
                 <a:stretch>
-                  <a:fillRect l="-1158" b="-11111"/>
-                </a:stretch>
-              </a:blipFill>
-            </p:spPr>
-            <p:txBody>
-              <a:bodyPr/>
-              <a:lstStyle/>
-              <a:p>
-                <a:r>
-                  <a:rPr lang="en-US">
-                    <a:noFill/>
-                  </a:rPr>
-                  <a:t> </a:t>
-                </a:r>
-              </a:p>
-            </p:txBody>
-          </p:sp>
-        </mc:Fallback>
-      </mc:AlternateContent>
-      <mc:AlternateContent xmlns:mc="http://schemas.openxmlformats.org/markup-compatibility/2006" xmlns:a14="http://schemas.microsoft.com/office/drawing/2010/main">
-        <mc:Choice Requires="a14">
-          <p:sp>
-            <p:nvSpPr>
-              <p:cNvPr id="18" name="TextBox 17">
-                <a:extLst>
-                  <a:ext uri="{FF2B5EF4-FFF2-40B4-BE49-F238E27FC236}">
-                    <a16:creationId xmlns:a16="http://schemas.microsoft.com/office/drawing/2014/main" id="{58015451-F995-B349-8965-8DFBC41EA4F5}"/>
-                  </a:ext>
-                </a:extLst>
-              </p:cNvPr>
-              <p:cNvSpPr txBox="1"/>
-              <p:nvPr/>
-            </p:nvSpPr>
-            <p:spPr>
-              <a:xfrm>
-                <a:off x="1689315" y="3611105"/>
-                <a:ext cx="1763688" cy="584775"/>
-              </a:xfrm>
-              <a:prstGeom prst="rect">
-                <a:avLst/>
-              </a:prstGeom>
-              <a:noFill/>
-            </p:spPr>
-            <p:txBody>
-              <a:bodyPr wrap="none" rtlCol="0">
-                <a:spAutoFit/>
-              </a:bodyPr>
-              <a:lstStyle/>
-              <a:p>
-                <a:r>
-                  <a:rPr lang="en-US" sz="3200" dirty="0">
-                    <a:latin typeface="Cambria Math" panose="02040503050406030204" pitchFamily="18" charset="0"/>
-                    <a:ea typeface="Cambria Math" panose="02040503050406030204" pitchFamily="18" charset="0"/>
-                  </a:rPr>
-                  <a:t>Z = -</a:t>
-                </a:r>
-                <a14:m>
-                  <m:oMath xmlns:m="http://schemas.openxmlformats.org/officeDocument/2006/math">
-                    <m:sSup>
-                      <m:sSupPr>
-                        <m:ctrlPr>
-                          <a:rPr lang="en-US" sz="3200" i="1" smtClean="0">
-                            <a:latin typeface="Cambria Math" panose="02040503050406030204" pitchFamily="18" charset="0"/>
-                            <a:ea typeface="Cambria Math" panose="02040503050406030204" pitchFamily="18" charset="0"/>
-                          </a:rPr>
-                        </m:ctrlPr>
-                      </m:sSupPr>
-                      <m:e>
-                        <m:r>
-                          <a:rPr lang="en-US" sz="3200" i="1" smtClean="0">
-                            <a:latin typeface="Cambria Math" panose="02040503050406030204" pitchFamily="18" charset="0"/>
-                            <a:ea typeface="Cambria Math" panose="02040503050406030204" pitchFamily="18" charset="0"/>
-                          </a:rPr>
-                          <m:t>𝜃</m:t>
-                        </m:r>
-                      </m:e>
-                      <m:sup>
-                        <m:r>
-                          <a:rPr lang="en-US" sz="3200" b="0" i="1" smtClean="0">
-                            <a:latin typeface="Cambria Math" panose="02040503050406030204" pitchFamily="18" charset="0"/>
-                            <a:ea typeface="Cambria Math" panose="02040503050406030204" pitchFamily="18" charset="0"/>
-                          </a:rPr>
-                          <m:t>𝑇</m:t>
-                        </m:r>
-                      </m:sup>
-                    </m:sSup>
-                    <m:r>
-                      <a:rPr lang="en-US" sz="3200" b="0" i="1" smtClean="0">
-                        <a:latin typeface="Cambria Math" panose="02040503050406030204" pitchFamily="18" charset="0"/>
-                        <a:ea typeface="Cambria Math" panose="02040503050406030204" pitchFamily="18" charset="0"/>
-                      </a:rPr>
-                      <m:t>𝑋</m:t>
-                    </m:r>
-                  </m:oMath>
-                </a14:m>
-                <a:endParaRPr lang="en-US" sz="3200" dirty="0">
-                  <a:latin typeface="Cambria Math" panose="02040503050406030204" pitchFamily="18" charset="0"/>
-                  <a:ea typeface="Cambria Math" panose="02040503050406030204" pitchFamily="18" charset="0"/>
-                </a:endParaRPr>
-              </a:p>
-            </p:txBody>
-          </p:sp>
-        </mc:Choice>
-        <mc:Fallback xmlns="">
-          <p:sp>
-            <p:nvSpPr>
-              <p:cNvPr id="18" name="TextBox 17">
-                <a:extLst>
-                  <a:ext uri="{FF2B5EF4-FFF2-40B4-BE49-F238E27FC236}">
-                    <a16:creationId xmlns:a16="http://schemas.microsoft.com/office/drawing/2014/main" id="{58015451-F995-B349-8965-8DFBC41EA4F5}"/>
-                  </a:ext>
-                </a:extLst>
-              </p:cNvPr>
-              <p:cNvSpPr txBox="1">
-                <a:spLocks noRot="1" noChangeAspect="1" noMove="1" noResize="1" noEditPoints="1" noAdjustHandles="1" noChangeArrowheads="1" noChangeShapeType="1" noTextEdit="1"/>
-              </p:cNvSpPr>
-              <p:nvPr/>
-            </p:nvSpPr>
-            <p:spPr>
-              <a:xfrm>
-                <a:off x="1689315" y="3611105"/>
-                <a:ext cx="1763688" cy="584775"/>
-              </a:xfrm>
-              <a:prstGeom prst="rect">
-                <a:avLst/>
-              </a:prstGeom>
-              <a:blipFill>
-                <a:blip r:embed="rId4"/>
-                <a:stretch>
-                  <a:fillRect l="-8571" t="-10638" r="-714" b="-34043"/>
+                  <a:fillRect l="-1158" b="-1449"/>
                 </a:stretch>
               </a:blipFill>
             </p:spPr>
@@ -4626,8 +4656,8 @@
           </a:p>
         </p:txBody>
       </p:sp>
-      <mc:AlternateContent xmlns:mc="http://schemas.openxmlformats.org/markup-compatibility/2006" xmlns:a14="http://schemas.microsoft.com/office/drawing/2010/main">
-        <mc:Choice Requires="a14">
+      <mc:AlternateContent xmlns:mc="http://schemas.openxmlformats.org/markup-compatibility/2006">
+        <mc:Choice xmlns:a14="http://schemas.microsoft.com/office/drawing/2010/main" Requires="a14">
           <p:sp>
             <p:nvSpPr>
               <p:cNvPr id="3" name="Content Placeholder 2">
@@ -4656,6 +4686,12 @@
               <a:p>
                 <a14:m>
                   <m:oMath xmlns:m="http://schemas.openxmlformats.org/officeDocument/2006/math">
+                    <m:r>
+                      <a:rPr lang="en-US" b="0" i="1" smtClean="0">
+                        <a:latin typeface="Cambria Math" panose="02040503050406030204" pitchFamily="18" charset="0"/>
+                      </a:rPr>
+                      <m:t>−(</m:t>
+                    </m:r>
                     <m:r>
                       <a:rPr lang="en-US" b="0" i="1" smtClean="0">
                         <a:latin typeface="Cambria Math" panose="02040503050406030204" pitchFamily="18" charset="0"/>
@@ -4859,6 +4895,12 @@
                       <a:rPr lang="en-US" b="0" i="1" smtClean="0">
                         <a:latin typeface="Cambria Math" panose="02040503050406030204" pitchFamily="18" charset="0"/>
                       </a:rPr>
+                      <m:t>)</m:t>
+                    </m:r>
+                    <m:r>
+                      <a:rPr lang="en-US" b="0" i="1" smtClean="0">
+                        <a:latin typeface="Cambria Math" panose="02040503050406030204" pitchFamily="18" charset="0"/>
+                      </a:rPr>
                       <m:t>     </m:t>
                     </m:r>
                   </m:oMath>
@@ -4868,7 +4910,7 @@
             </p:txBody>
           </p:sp>
         </mc:Choice>
-        <mc:Fallback xmlns="">
+        <mc:Fallback>
           <p:sp>
             <p:nvSpPr>
               <p:cNvPr id="3" name="Content Placeholder 2">
@@ -5146,7 +5188,7 @@
             <p:spPr>
               <a:xfrm>
                 <a:off x="714214" y="2405888"/>
-                <a:ext cx="10389896" cy="1050031"/>
+                <a:ext cx="10518136" cy="1050031"/>
               </a:xfrm>
               <a:prstGeom prst="rect">
                 <a:avLst/>
@@ -5566,6 +5608,12 @@
                                               </m:d>
                                             </m:e>
                                           </m:d>
+                                          <m:r>
+                                            <a:rPr lang="en-US" sz="2400" b="0" i="1" smtClean="0">
+                                              <a:latin typeface="Cambria Math" panose="02040503050406030204" pitchFamily="18" charset="0"/>
+                                            </a:rPr>
+                                            <m:t>)</m:t>
+                                          </m:r>
                                         </m:e>
                                       </m:func>
                                     </m:e>
@@ -5711,7 +5759,7 @@
             <p:spPr>
               <a:xfrm>
                 <a:off x="714214" y="2405888"/>
-                <a:ext cx="10389896" cy="1050031"/>
+                <a:ext cx="10518136" cy="1050031"/>
               </a:xfrm>
               <a:prstGeom prst="rect">
                 <a:avLst/>
@@ -5719,7 +5767,7 @@
               <a:blipFill>
                 <a:blip r:embed="rId2"/>
                 <a:stretch>
-                  <a:fillRect l="-1954" t="-114286" r="-3053" b="-169048"/>
+                  <a:fillRect l="-1930" t="-114286" r="-3016" b="-169048"/>
                 </a:stretch>
               </a:blipFill>
             </p:spPr>
@@ -5755,7 +5803,7 @@
             <p:spPr>
               <a:xfrm>
                 <a:off x="838200" y="4237360"/>
-                <a:ext cx="9096978" cy="1050031"/>
+                <a:ext cx="9202263" cy="1050031"/>
               </a:xfrm>
               <a:prstGeom prst="rect">
                 <a:avLst/>
@@ -5907,7 +5955,7 @@
                                     <a:rPr lang="en-US" sz="2400" b="0" i="1" smtClean="0">
                                       <a:latin typeface="Cambria Math" panose="02040503050406030204" pitchFamily="18" charset="0"/>
                                     </a:rPr>
-                                    <m:t>(−</m:t>
+                                    <m:t>(</m:t>
                                   </m:r>
                                   <m:func>
                                     <m:funcPr>
@@ -6118,12 +6166,43 @@
                                           </m:r>
                                         </m:sup>
                                       </m:sSup>
-                                      <m:r>
-                                        <a:rPr lang="en-US" sz="2400" b="0" i="1" smtClean="0">
-                                          <a:latin typeface="Cambria Math" panose="02040503050406030204" pitchFamily="18" charset="0"/>
-                                        </a:rPr>
-                                        <m:t>𝑥</m:t>
-                                      </m:r>
+                                      <m:sSup>
+                                        <m:sSupPr>
+                                          <m:ctrlPr>
+                                            <a:rPr lang="en-US" sz="2400" b="0" i="1" smtClean="0">
+                                              <a:latin typeface="Cambria Math" panose="02040503050406030204" pitchFamily="18" charset="0"/>
+                                            </a:rPr>
+                                          </m:ctrlPr>
+                                        </m:sSupPr>
+                                        <m:e>
+                                          <m:r>
+                                            <a:rPr lang="en-US" sz="2400" b="0" i="1" smtClean="0">
+                                              <a:latin typeface="Cambria Math" panose="02040503050406030204" pitchFamily="18" charset="0"/>
+                                            </a:rPr>
+                                            <m:t>𝑥</m:t>
+                                          </m:r>
+                                        </m:e>
+                                        <m:sup>
+                                          <m:r>
+                                            <a:rPr lang="en-US" sz="2400" b="0" i="1" smtClean="0">
+                                              <a:latin typeface="Cambria Math" panose="02040503050406030204" pitchFamily="18" charset="0"/>
+                                            </a:rPr>
+                                            <m:t>(</m:t>
+                                          </m:r>
+                                          <m:r>
+                                            <a:rPr lang="en-US" sz="2400" b="0" i="1" smtClean="0">
+                                              <a:latin typeface="Cambria Math" panose="02040503050406030204" pitchFamily="18" charset="0"/>
+                                            </a:rPr>
+                                            <m:t>𝑖</m:t>
+                                          </m:r>
+                                          <m:r>
+                                            <a:rPr lang="en-US" sz="2400" b="0" i="1" smtClean="0">
+                                              <a:latin typeface="Cambria Math" panose="02040503050406030204" pitchFamily="18" charset="0"/>
+                                            </a:rPr>
+                                            <m:t>)</m:t>
+                                          </m:r>
+                                        </m:sup>
+                                      </m:sSup>
                                       <m:r>
                                         <a:rPr lang="en-US" sz="2400" b="0" i="1" smtClean="0">
                                           <a:latin typeface="Cambria Math" panose="02040503050406030204" pitchFamily="18" charset="0"/>
@@ -6266,7 +6345,7 @@
             <p:spPr>
               <a:xfrm>
                 <a:off x="838200" y="4237360"/>
-                <a:ext cx="9096978" cy="1050031"/>
+                <a:ext cx="9202263" cy="1050031"/>
               </a:xfrm>
               <a:prstGeom prst="rect">
                 <a:avLst/>
@@ -6274,7 +6353,7 @@
               <a:blipFill>
                 <a:blip r:embed="rId3"/>
                 <a:stretch>
-                  <a:fillRect l="-3068" t="-116867" r="-3487" b="-171084"/>
+                  <a:fillRect l="-2479" t="-116867" r="-2755" b="-171084"/>
                 </a:stretch>
               </a:blipFill>
             </p:spPr>
@@ -6454,6 +6533,977 @@
           <p:cNvPr id="2" name="Title 1">
             <a:extLst>
               <a:ext uri="{FF2B5EF4-FFF2-40B4-BE49-F238E27FC236}">
+                <a16:creationId xmlns:a16="http://schemas.microsoft.com/office/drawing/2014/main" id="{FB603E30-7394-1A48-96CF-8B77E12E3F8D}"/>
+              </a:ext>
+            </a:extLst>
+          </p:cNvPr>
+          <p:cNvSpPr>
+            <a:spLocks noGrp="1"/>
+          </p:cNvSpPr>
+          <p:nvPr>
+            <p:ph type="title"/>
+          </p:nvPr>
+        </p:nvSpPr>
+        <p:spPr/>
+        <p:txBody>
+          <a:bodyPr/>
+          <a:lstStyle/>
+          <a:p>
+            <a:r>
+              <a:rPr lang="en-US" dirty="0" err="1"/>
+              <a:t>Hipótese</a:t>
+            </a:r>
+            <a:r>
+              <a:rPr lang="en-US" dirty="0"/>
+              <a:t> SVM</a:t>
+            </a:r>
+          </a:p>
+        </p:txBody>
+      </p:sp>
+      <mc:AlternateContent xmlns:mc="http://schemas.openxmlformats.org/markup-compatibility/2006" xmlns:a14="http://schemas.microsoft.com/office/drawing/2010/main">
+        <mc:Choice Requires="a14">
+          <p:sp>
+            <p:nvSpPr>
+              <p:cNvPr id="3" name="Content Placeholder 2">
+                <a:extLst>
+                  <a:ext uri="{FF2B5EF4-FFF2-40B4-BE49-F238E27FC236}">
+                    <a16:creationId xmlns:a16="http://schemas.microsoft.com/office/drawing/2014/main" id="{6E546F6E-D2A3-F349-A2F8-FA30684BDB29}"/>
+                  </a:ext>
+                </a:extLst>
+              </p:cNvPr>
+              <p:cNvSpPr>
+                <a:spLocks noGrp="1"/>
+              </p:cNvSpPr>
+              <p:nvPr>
+                <p:ph idx="1"/>
+              </p:nvPr>
+            </p:nvSpPr>
+            <p:spPr/>
+            <p:txBody>
+              <a:bodyPr/>
+              <a:lstStyle/>
+              <a:p>
+                <a:endParaRPr lang="en-US" dirty="0"/>
+              </a:p>
+              <a:p>
+                <a:endParaRPr lang="en-US" dirty="0"/>
+              </a:p>
+              <a:p>
+                <a:endParaRPr lang="en-US" dirty="0"/>
+              </a:p>
+              <a:p>
+                <a:endParaRPr lang="en-US" dirty="0"/>
+              </a:p>
+              <a:p>
+                <a:pPr marL="0" indent="0">
+                  <a:buNone/>
+                </a:pPr>
+                <a:r>
+                  <a:rPr lang="en-US" dirty="0"/>
+                  <a:t>  </a:t>
+                </a:r>
+                <a:r>
+                  <a:rPr lang="en-US" dirty="0" err="1"/>
+                  <a:t>Hipótese</a:t>
+                </a:r>
+                <a:r>
+                  <a:rPr lang="en-US" dirty="0"/>
+                  <a:t>:</a:t>
+                </a:r>
+              </a:p>
+              <a:p>
+                <a:pPr marL="0" indent="0">
+                  <a:buNone/>
+                </a:pPr>
+                <a14:m>
+                  <m:oMathPara xmlns:m="http://schemas.openxmlformats.org/officeDocument/2006/math">
+                    <m:oMathParaPr>
+                      <m:jc m:val="centerGroup"/>
+                    </m:oMathParaPr>
+                    <m:oMath xmlns:m="http://schemas.openxmlformats.org/officeDocument/2006/math">
+                      <m:sSub>
+                        <m:sSubPr>
+                          <m:ctrlPr>
+                            <a:rPr lang="en-US" i="1">
+                              <a:latin typeface="Cambria Math" panose="02040503050406030204" pitchFamily="18" charset="0"/>
+                            </a:rPr>
+                          </m:ctrlPr>
+                        </m:sSubPr>
+                        <m:e>
+                          <m:r>
+                            <a:rPr lang="en-US" i="1">
+                              <a:latin typeface="Cambria Math" panose="02040503050406030204" pitchFamily="18" charset="0"/>
+                            </a:rPr>
+                            <m:t>h</m:t>
+                          </m:r>
+                        </m:e>
+                        <m:sub>
+                          <m:r>
+                            <a:rPr lang="en-US" i="1">
+                              <a:latin typeface="Cambria Math" panose="02040503050406030204" pitchFamily="18" charset="0"/>
+                              <a:ea typeface="Cambria Math" panose="02040503050406030204" pitchFamily="18" charset="0"/>
+                            </a:rPr>
+                            <m:t>𝜃</m:t>
+                          </m:r>
+                        </m:sub>
+                      </m:sSub>
+                      <m:d>
+                        <m:dPr>
+                          <m:ctrlPr>
+                            <a:rPr lang="en-US" i="1">
+                              <a:latin typeface="Cambria Math" panose="02040503050406030204" pitchFamily="18" charset="0"/>
+                            </a:rPr>
+                          </m:ctrlPr>
+                        </m:dPr>
+                        <m:e>
+                          <m:r>
+                            <a:rPr lang="en-US" i="1">
+                              <a:latin typeface="Cambria Math" panose="02040503050406030204" pitchFamily="18" charset="0"/>
+                            </a:rPr>
+                            <m:t>𝑥</m:t>
+                          </m:r>
+                        </m:e>
+                      </m:d>
+                      <m:r>
+                        <a:rPr lang="en-US" i="1">
+                          <a:latin typeface="Cambria Math" panose="02040503050406030204" pitchFamily="18" charset="0"/>
+                        </a:rPr>
+                        <m:t>= </m:t>
+                      </m:r>
+                      <m:d>
+                        <m:dPr>
+                          <m:begChr m:val="{"/>
+                          <m:endChr m:val=""/>
+                          <m:ctrlPr>
+                            <a:rPr lang="en-US" i="1">
+                              <a:latin typeface="Cambria Math" panose="02040503050406030204" pitchFamily="18" charset="0"/>
+                            </a:rPr>
+                          </m:ctrlPr>
+                        </m:dPr>
+                        <m:e>
+                          <m:eqArr>
+                            <m:eqArrPr>
+                              <m:ctrlPr>
+                                <a:rPr lang="en-US" i="1">
+                                  <a:latin typeface="Cambria Math" panose="02040503050406030204" pitchFamily="18" charset="0"/>
+                                </a:rPr>
+                              </m:ctrlPr>
+                            </m:eqArrPr>
+                            <m:e>
+                              <m:r>
+                                <a:rPr lang="en-US" i="1">
+                                  <a:latin typeface="Cambria Math" panose="02040503050406030204" pitchFamily="18" charset="0"/>
+                                </a:rPr>
+                                <m:t>1 </m:t>
+                              </m:r>
+                              <m:r>
+                                <a:rPr lang="en-US" i="1">
+                                  <a:latin typeface="Cambria Math" panose="02040503050406030204" pitchFamily="18" charset="0"/>
+                                </a:rPr>
+                                <m:t>𝑠𝑒</m:t>
+                              </m:r>
+                              <m:r>
+                                <a:rPr lang="en-US" i="1">
+                                  <a:latin typeface="Cambria Math" panose="02040503050406030204" pitchFamily="18" charset="0"/>
+                                </a:rPr>
+                                <m:t> </m:t>
+                              </m:r>
+                              <m:sSup>
+                                <m:sSupPr>
+                                  <m:ctrlPr>
+                                    <a:rPr lang="en-US" i="1">
+                                      <a:latin typeface="Cambria Math" panose="02040503050406030204" pitchFamily="18" charset="0"/>
+                                    </a:rPr>
+                                  </m:ctrlPr>
+                                </m:sSupPr>
+                                <m:e>
+                                  <m:r>
+                                    <a:rPr lang="en-US" i="1">
+                                      <a:latin typeface="Cambria Math" panose="02040503050406030204" pitchFamily="18" charset="0"/>
+                                      <a:ea typeface="Cambria Math" panose="02040503050406030204" pitchFamily="18" charset="0"/>
+                                    </a:rPr>
+                                    <m:t>𝜃</m:t>
+                                  </m:r>
+                                </m:e>
+                                <m:sup>
+                                  <m:r>
+                                    <a:rPr lang="en-US" i="1">
+                                      <a:latin typeface="Cambria Math" panose="02040503050406030204" pitchFamily="18" charset="0"/>
+                                    </a:rPr>
+                                    <m:t>𝑇</m:t>
+                                  </m:r>
+                                </m:sup>
+                              </m:sSup>
+                              <m:r>
+                                <a:rPr lang="en-US" i="1">
+                                  <a:latin typeface="Cambria Math" panose="02040503050406030204" pitchFamily="18" charset="0"/>
+                                </a:rPr>
+                                <m:t>𝑋</m:t>
+                              </m:r>
+                              <m:r>
+                                <a:rPr lang="en-US" i="1">
+                                  <a:latin typeface="Cambria Math" panose="02040503050406030204" pitchFamily="18" charset="0"/>
+                                </a:rPr>
+                                <m:t> ≥0</m:t>
+                              </m:r>
+                            </m:e>
+                            <m:e>
+                              <m:r>
+                                <a:rPr lang="en-US" i="1">
+                                  <a:latin typeface="Cambria Math" panose="02040503050406030204" pitchFamily="18" charset="0"/>
+                                </a:rPr>
+                                <m:t>0, </m:t>
+                              </m:r>
+                              <m:r>
+                                <a:rPr lang="en-US" i="1">
+                                  <a:latin typeface="Cambria Math" panose="02040503050406030204" pitchFamily="18" charset="0"/>
+                                </a:rPr>
+                                <m:t>𝑐𝑎𝑠𝑜</m:t>
+                              </m:r>
+                              <m:r>
+                                <a:rPr lang="en-US" i="1">
+                                  <a:latin typeface="Cambria Math" panose="02040503050406030204" pitchFamily="18" charset="0"/>
+                                </a:rPr>
+                                <m:t> </m:t>
+                              </m:r>
+                              <m:r>
+                                <a:rPr lang="en-US" i="1">
+                                  <a:latin typeface="Cambria Math" panose="02040503050406030204" pitchFamily="18" charset="0"/>
+                                </a:rPr>
+                                <m:t>𝑐𝑜𝑛𝑡𝑟</m:t>
+                              </m:r>
+                              <m:r>
+                                <a:rPr lang="en-US" i="1">
+                                  <a:latin typeface="Cambria Math" panose="02040503050406030204" pitchFamily="18" charset="0"/>
+                                </a:rPr>
+                                <m:t>á</m:t>
+                              </m:r>
+                              <m:r>
+                                <a:rPr lang="en-US" i="1">
+                                  <a:latin typeface="Cambria Math" panose="02040503050406030204" pitchFamily="18" charset="0"/>
+                                </a:rPr>
+                                <m:t>𝑟𝑖𝑜</m:t>
+                              </m:r>
+                            </m:e>
+                          </m:eqArr>
+                        </m:e>
+                      </m:d>
+                    </m:oMath>
+                  </m:oMathPara>
+                </a14:m>
+                <a:endParaRPr lang="en-US" dirty="0"/>
+              </a:p>
+            </p:txBody>
+          </p:sp>
+        </mc:Choice>
+        <mc:Fallback xmlns="">
+          <p:sp>
+            <p:nvSpPr>
+              <p:cNvPr id="3" name="Content Placeholder 2">
+                <a:extLst>
+                  <a:ext uri="{FF2B5EF4-FFF2-40B4-BE49-F238E27FC236}">
+                    <a16:creationId xmlns:a16="http://schemas.microsoft.com/office/drawing/2014/main" id="{6E546F6E-D2A3-F349-A2F8-FA30684BDB29}"/>
+                  </a:ext>
+                </a:extLst>
+              </p:cNvPr>
+              <p:cNvSpPr>
+                <a:spLocks noGrp="1" noRot="1" noChangeAspect="1" noMove="1" noResize="1" noEditPoints="1" noAdjustHandles="1" noChangeArrowheads="1" noChangeShapeType="1" noTextEdit="1"/>
+              </p:cNvSpPr>
+              <p:nvPr>
+                <p:ph idx="1"/>
+              </p:nvPr>
+            </p:nvSpPr>
+            <p:spPr>
+              <a:blipFill>
+                <a:blip r:embed="rId2"/>
+                <a:stretch>
+                  <a:fillRect b="-50000"/>
+                </a:stretch>
+              </a:blipFill>
+            </p:spPr>
+            <p:txBody>
+              <a:bodyPr/>
+              <a:lstStyle/>
+              <a:p>
+                <a:r>
+                  <a:rPr lang="en-US">
+                    <a:noFill/>
+                  </a:rPr>
+                  <a:t> </a:t>
+                </a:r>
+              </a:p>
+            </p:txBody>
+          </p:sp>
+        </mc:Fallback>
+      </mc:AlternateContent>
+      <p:sp>
+        <p:nvSpPr>
+          <p:cNvPr id="4" name="TextBox 3">
+            <a:extLst>
+              <a:ext uri="{FF2B5EF4-FFF2-40B4-BE49-F238E27FC236}">
+                <a16:creationId xmlns:a16="http://schemas.microsoft.com/office/drawing/2014/main" id="{F3D212E2-3C8A-3F4F-9473-B111B51281CE}"/>
+              </a:ext>
+            </a:extLst>
+          </p:cNvPr>
+          <p:cNvSpPr txBox="1"/>
+          <p:nvPr/>
+        </p:nvSpPr>
+        <p:spPr>
+          <a:xfrm>
+            <a:off x="954315" y="2022674"/>
+            <a:ext cx="2238818" cy="523220"/>
+          </a:xfrm>
+          <a:prstGeom prst="rect">
+            <a:avLst/>
+          </a:prstGeom>
+          <a:noFill/>
+        </p:spPr>
+        <p:txBody>
+          <a:bodyPr wrap="none" rtlCol="0">
+            <a:spAutoFit/>
+          </a:bodyPr>
+          <a:lstStyle/>
+          <a:p>
+            <a:r>
+              <a:rPr lang="en-US" sz="2800" dirty="0" err="1"/>
+              <a:t>Funcão</a:t>
+            </a:r>
+            <a:r>
+              <a:rPr lang="en-US" sz="2800" dirty="0"/>
+              <a:t> </a:t>
+            </a:r>
+            <a:r>
+              <a:rPr lang="en-US" sz="2800" dirty="0" err="1"/>
+              <a:t>Custo</a:t>
+            </a:r>
+            <a:r>
+              <a:rPr lang="en-US" sz="2800" dirty="0"/>
+              <a:t>:</a:t>
+            </a:r>
+          </a:p>
+        </p:txBody>
+      </p:sp>
+      <mc:AlternateContent xmlns:mc="http://schemas.openxmlformats.org/markup-compatibility/2006">
+        <mc:Choice xmlns:a14="http://schemas.microsoft.com/office/drawing/2010/main" Requires="a14">
+          <p:sp>
+            <p:nvSpPr>
+              <p:cNvPr id="5" name="TextBox 4">
+                <a:extLst>
+                  <a:ext uri="{FF2B5EF4-FFF2-40B4-BE49-F238E27FC236}">
+                    <a16:creationId xmlns:a16="http://schemas.microsoft.com/office/drawing/2014/main" id="{D7FC0AF6-8425-6342-8667-166510783B83}"/>
+                  </a:ext>
+                </a:extLst>
+              </p:cNvPr>
+              <p:cNvSpPr txBox="1"/>
+              <p:nvPr/>
+            </p:nvSpPr>
+            <p:spPr>
+              <a:xfrm>
+                <a:off x="1122665" y="2484339"/>
+                <a:ext cx="9202263" cy="1050031"/>
+              </a:xfrm>
+              <a:prstGeom prst="rect">
+                <a:avLst/>
+              </a:prstGeom>
+              <a:noFill/>
+            </p:spPr>
+            <p:txBody>
+              <a:bodyPr wrap="none" lIns="0" tIns="0" rIns="0" bIns="0" rtlCol="0">
+                <a:spAutoFit/>
+              </a:bodyPr>
+              <a:lstStyle/>
+              <a:p>
+                <a:pPr/>
+                <a14:m>
+                  <m:oMathPara xmlns:m="http://schemas.openxmlformats.org/officeDocument/2006/math">
+                    <m:oMathParaPr>
+                      <m:jc m:val="centerGroup"/>
+                    </m:oMathParaPr>
+                    <m:oMath xmlns:m="http://schemas.openxmlformats.org/officeDocument/2006/math">
+                      <m:func>
+                        <m:funcPr>
+                          <m:ctrlPr>
+                            <a:rPr lang="en-US" sz="2400" b="0" i="1" smtClean="0">
+                              <a:latin typeface="Cambria Math" panose="02040503050406030204" pitchFamily="18" charset="0"/>
+                            </a:rPr>
+                          </m:ctrlPr>
+                        </m:funcPr>
+                        <m:fName>
+                          <m:limLow>
+                            <m:limLowPr>
+                              <m:ctrlPr>
+                                <a:rPr lang="en-US" sz="2400" b="0" i="1" smtClean="0">
+                                  <a:latin typeface="Cambria Math" panose="02040503050406030204" pitchFamily="18" charset="0"/>
+                                </a:rPr>
+                              </m:ctrlPr>
+                            </m:limLowPr>
+                            <m:e>
+                              <m:r>
+                                <m:rPr>
+                                  <m:sty m:val="p"/>
+                                </m:rPr>
+                                <a:rPr lang="en-US" sz="2400" b="0" i="0" smtClean="0">
+                                  <a:latin typeface="Cambria Math" panose="02040503050406030204" pitchFamily="18" charset="0"/>
+                                </a:rPr>
+                                <m:t>min</m:t>
+                              </m:r>
+                            </m:e>
+                            <m:lim>
+                              <m:r>
+                                <a:rPr lang="en-US" sz="2400" b="0" i="1" smtClean="0">
+                                  <a:latin typeface="Cambria Math" panose="02040503050406030204" pitchFamily="18" charset="0"/>
+                                  <a:ea typeface="Cambria Math" panose="02040503050406030204" pitchFamily="18" charset="0"/>
+                                </a:rPr>
+                                <m:t>𝜃</m:t>
+                              </m:r>
+                            </m:lim>
+                          </m:limLow>
+                        </m:fName>
+                        <m:e>
+                          <m:r>
+                            <a:rPr lang="en-US" sz="2400" b="0" i="1" smtClean="0">
+                              <a:latin typeface="Cambria Math" panose="02040503050406030204" pitchFamily="18" charset="0"/>
+                            </a:rPr>
+                            <m:t>𝐶</m:t>
+                          </m:r>
+                          <m:nary>
+                            <m:naryPr>
+                              <m:chr m:val="∑"/>
+                              <m:ctrlPr>
+                                <a:rPr lang="en-US" sz="2400" b="0" i="1" smtClean="0">
+                                  <a:latin typeface="Cambria Math" panose="02040503050406030204" pitchFamily="18" charset="0"/>
+                                </a:rPr>
+                              </m:ctrlPr>
+                            </m:naryPr>
+                            <m:sub>
+                              <m:r>
+                                <m:rPr>
+                                  <m:brk m:alnAt="23"/>
+                                </m:rPr>
+                                <a:rPr lang="en-US" sz="2400" b="0" i="1" smtClean="0">
+                                  <a:latin typeface="Cambria Math" panose="02040503050406030204" pitchFamily="18" charset="0"/>
+                                </a:rPr>
+                                <m:t>𝑖</m:t>
+                              </m:r>
+                              <m:r>
+                                <a:rPr lang="en-US" sz="2400" b="0" i="1" smtClean="0">
+                                  <a:latin typeface="Cambria Math" panose="02040503050406030204" pitchFamily="18" charset="0"/>
+                                </a:rPr>
+                                <m:t>=1</m:t>
+                              </m:r>
+                            </m:sub>
+                            <m:sup>
+                              <m:r>
+                                <a:rPr lang="en-US" sz="2400" b="0" i="1" smtClean="0">
+                                  <a:latin typeface="Cambria Math" panose="02040503050406030204" pitchFamily="18" charset="0"/>
+                                </a:rPr>
+                                <m:t>𝑚</m:t>
+                              </m:r>
+                            </m:sup>
+                            <m:e>
+                              <m:d>
+                                <m:dPr>
+                                  <m:begChr m:val="["/>
+                                  <m:endChr m:val="]"/>
+                                  <m:ctrlPr>
+                                    <a:rPr lang="en-US" sz="2400" b="0" i="1" smtClean="0">
+                                      <a:latin typeface="Cambria Math" panose="02040503050406030204" pitchFamily="18" charset="0"/>
+                                    </a:rPr>
+                                  </m:ctrlPr>
+                                </m:dPr>
+                                <m:e>
+                                  <m:sSup>
+                                    <m:sSupPr>
+                                      <m:ctrlPr>
+                                        <a:rPr lang="en-US" sz="2400" b="0" i="1" smtClean="0">
+                                          <a:latin typeface="Cambria Math" panose="02040503050406030204" pitchFamily="18" charset="0"/>
+                                        </a:rPr>
+                                      </m:ctrlPr>
+                                    </m:sSupPr>
+                                    <m:e>
+                                      <m:r>
+                                        <a:rPr lang="en-US" sz="2400" b="0" i="1" smtClean="0">
+                                          <a:latin typeface="Cambria Math" panose="02040503050406030204" pitchFamily="18" charset="0"/>
+                                        </a:rPr>
+                                        <m:t>𝑦</m:t>
+                                      </m:r>
+                                    </m:e>
+                                    <m:sup>
+                                      <m:d>
+                                        <m:dPr>
+                                          <m:ctrlPr>
+                                            <a:rPr lang="en-US" sz="2400" b="0" i="1" smtClean="0">
+                                              <a:latin typeface="Cambria Math" panose="02040503050406030204" pitchFamily="18" charset="0"/>
+                                            </a:rPr>
+                                          </m:ctrlPr>
+                                        </m:dPr>
+                                        <m:e>
+                                          <m:r>
+                                            <a:rPr lang="en-US" sz="2400" b="0" i="1" smtClean="0">
+                                              <a:latin typeface="Cambria Math" panose="02040503050406030204" pitchFamily="18" charset="0"/>
+                                            </a:rPr>
+                                            <m:t>𝑖</m:t>
+                                          </m:r>
+                                        </m:e>
+                                      </m:d>
+                                    </m:sup>
+                                  </m:sSup>
+                                  <m:r>
+                                    <a:rPr lang="en-US" sz="2400" b="0" i="1" smtClean="0">
+                                      <a:latin typeface="Cambria Math" panose="02040503050406030204" pitchFamily="18" charset="0"/>
+                                    </a:rPr>
+                                    <m:t>(</m:t>
+                                  </m:r>
+                                  <m:func>
+                                    <m:funcPr>
+                                      <m:ctrlPr>
+                                        <a:rPr lang="en-US" sz="2400" b="0" i="1" smtClean="0">
+                                          <a:latin typeface="Cambria Math" panose="02040503050406030204" pitchFamily="18" charset="0"/>
+                                        </a:rPr>
+                                      </m:ctrlPr>
+                                    </m:funcPr>
+                                    <m:fName>
+                                      <m:sSub>
+                                        <m:sSubPr>
+                                          <m:ctrlPr>
+                                            <a:rPr lang="en-US" sz="2400" b="0" i="1" smtClean="0">
+                                              <a:latin typeface="Cambria Math" panose="02040503050406030204" pitchFamily="18" charset="0"/>
+                                            </a:rPr>
+                                          </m:ctrlPr>
+                                        </m:sSubPr>
+                                        <m:e>
+                                          <m:r>
+                                            <a:rPr lang="en-US" sz="2400" b="0" i="1" smtClean="0">
+                                              <a:latin typeface="Cambria Math" panose="02040503050406030204" pitchFamily="18" charset="0"/>
+                                            </a:rPr>
+                                            <m:t>𝑐𝑜𝑠𝑡</m:t>
+                                          </m:r>
+                                        </m:e>
+                                        <m:sub>
+                                          <m:r>
+                                            <a:rPr lang="en-US" sz="2400" b="0" i="1" smtClean="0">
+                                              <a:latin typeface="Cambria Math" panose="02040503050406030204" pitchFamily="18" charset="0"/>
+                                            </a:rPr>
+                                            <m:t>1</m:t>
+                                          </m:r>
+                                        </m:sub>
+                                      </m:sSub>
+                                    </m:fName>
+                                    <m:e>
+                                      <m:r>
+                                        <a:rPr lang="en-US" sz="2400" b="0" i="1" smtClean="0">
+                                          <a:latin typeface="Cambria Math" panose="02040503050406030204" pitchFamily="18" charset="0"/>
+                                        </a:rPr>
+                                        <m:t> (</m:t>
+                                      </m:r>
+                                      <m:sSup>
+                                        <m:sSupPr>
+                                          <m:ctrlPr>
+                                            <a:rPr lang="en-US" sz="2400" b="0" i="1" smtClean="0">
+                                              <a:latin typeface="Cambria Math" panose="02040503050406030204" pitchFamily="18" charset="0"/>
+                                            </a:rPr>
+                                          </m:ctrlPr>
+                                        </m:sSupPr>
+                                        <m:e>
+                                          <m:sSup>
+                                            <m:sSupPr>
+                                              <m:ctrlPr>
+                                                <a:rPr lang="en-US" sz="2400" b="0" i="1" smtClean="0">
+                                                  <a:latin typeface="Cambria Math" panose="02040503050406030204" pitchFamily="18" charset="0"/>
+                                                </a:rPr>
+                                              </m:ctrlPr>
+                                            </m:sSupPr>
+                                            <m:e>
+                                              <m:r>
+                                                <a:rPr lang="en-US" sz="2400" b="0" i="1" smtClean="0">
+                                                  <a:latin typeface="Cambria Math" panose="02040503050406030204" pitchFamily="18" charset="0"/>
+                                                  <a:ea typeface="Cambria Math" panose="02040503050406030204" pitchFamily="18" charset="0"/>
+                                                </a:rPr>
+                                                <m:t>𝜃</m:t>
+                                              </m:r>
+                                            </m:e>
+                                            <m:sup>
+                                              <m:r>
+                                                <a:rPr lang="en-US" sz="2400" b="0" i="1" smtClean="0">
+                                                  <a:latin typeface="Cambria Math" panose="02040503050406030204" pitchFamily="18" charset="0"/>
+                                                </a:rPr>
+                                                <m:t>𝑇</m:t>
+                                              </m:r>
+                                            </m:sup>
+                                          </m:sSup>
+                                          <m:r>
+                                            <a:rPr lang="en-US" sz="2400" b="0" i="1" smtClean="0">
+                                              <a:latin typeface="Cambria Math" panose="02040503050406030204" pitchFamily="18" charset="0"/>
+                                            </a:rPr>
+                                            <m:t>𝑥</m:t>
+                                          </m:r>
+                                        </m:e>
+                                        <m:sup>
+                                          <m:d>
+                                            <m:dPr>
+                                              <m:ctrlPr>
+                                                <a:rPr lang="en-US" sz="2400" b="0" i="1" smtClean="0">
+                                                  <a:latin typeface="Cambria Math" panose="02040503050406030204" pitchFamily="18" charset="0"/>
+                                                </a:rPr>
+                                              </m:ctrlPr>
+                                            </m:dPr>
+                                            <m:e>
+                                              <m:r>
+                                                <a:rPr lang="en-US" sz="2400" b="0" i="1" smtClean="0">
+                                                  <a:latin typeface="Cambria Math" panose="02040503050406030204" pitchFamily="18" charset="0"/>
+                                                </a:rPr>
+                                                <m:t>𝑖</m:t>
+                                              </m:r>
+                                            </m:e>
+                                          </m:d>
+                                        </m:sup>
+                                      </m:sSup>
+                                      <m:r>
+                                        <a:rPr lang="en-US" sz="2400" b="0" i="1" smtClean="0">
+                                          <a:latin typeface="Cambria Math" panose="02040503050406030204" pitchFamily="18" charset="0"/>
+                                        </a:rPr>
+                                        <m:t>))+(1 −</m:t>
+                                      </m:r>
+                                      <m:sSup>
+                                        <m:sSupPr>
+                                          <m:ctrlPr>
+                                            <a:rPr lang="en-US" sz="2400" b="0" i="1" smtClean="0">
+                                              <a:latin typeface="Cambria Math" panose="02040503050406030204" pitchFamily="18" charset="0"/>
+                                            </a:rPr>
+                                          </m:ctrlPr>
+                                        </m:sSupPr>
+                                        <m:e>
+                                          <m:r>
+                                            <a:rPr lang="en-US" sz="2400" b="0" i="1" smtClean="0">
+                                              <a:latin typeface="Cambria Math" panose="02040503050406030204" pitchFamily="18" charset="0"/>
+                                            </a:rPr>
+                                            <m:t>𝑦</m:t>
+                                          </m:r>
+                                        </m:e>
+                                        <m:sup>
+                                          <m:d>
+                                            <m:dPr>
+                                              <m:ctrlPr>
+                                                <a:rPr lang="en-US" sz="2400" b="0" i="1" smtClean="0">
+                                                  <a:latin typeface="Cambria Math" panose="02040503050406030204" pitchFamily="18" charset="0"/>
+                                                </a:rPr>
+                                              </m:ctrlPr>
+                                            </m:dPr>
+                                            <m:e>
+                                              <m:r>
+                                                <a:rPr lang="en-US" sz="2400" b="0" i="1" smtClean="0">
+                                                  <a:latin typeface="Cambria Math" panose="02040503050406030204" pitchFamily="18" charset="0"/>
+                                                </a:rPr>
+                                                <m:t>𝑖</m:t>
+                                              </m:r>
+                                            </m:e>
+                                          </m:d>
+                                        </m:sup>
+                                      </m:sSup>
+                                      <m:r>
+                                        <a:rPr lang="en-US" sz="2400" b="0" i="1" smtClean="0">
+                                          <a:latin typeface="Cambria Math" panose="02040503050406030204" pitchFamily="18" charset="0"/>
+                                        </a:rPr>
+                                        <m:t>) </m:t>
+                                      </m:r>
+                                      <m:sSub>
+                                        <m:sSubPr>
+                                          <m:ctrlPr>
+                                            <a:rPr lang="en-US" sz="2400" b="0" i="1" smtClean="0">
+                                              <a:latin typeface="Cambria Math" panose="02040503050406030204" pitchFamily="18" charset="0"/>
+                                            </a:rPr>
+                                          </m:ctrlPr>
+                                        </m:sSubPr>
+                                        <m:e>
+                                          <m:r>
+                                            <a:rPr lang="en-US" sz="2400" b="0" i="1" smtClean="0">
+                                              <a:latin typeface="Cambria Math" panose="02040503050406030204" pitchFamily="18" charset="0"/>
+                                            </a:rPr>
+                                            <m:t>𝑐𝑜𝑠𝑡</m:t>
+                                          </m:r>
+                                        </m:e>
+                                        <m:sub>
+                                          <m:r>
+                                            <a:rPr lang="en-US" sz="2400" b="0" i="1" smtClean="0">
+                                              <a:latin typeface="Cambria Math" panose="02040503050406030204" pitchFamily="18" charset="0"/>
+                                            </a:rPr>
+                                            <m:t>0</m:t>
+                                          </m:r>
+                                        </m:sub>
+                                      </m:sSub>
+                                      <m:r>
+                                        <a:rPr lang="en-US" sz="2400" b="0" i="1" smtClean="0">
+                                          <a:latin typeface="Cambria Math" panose="02040503050406030204" pitchFamily="18" charset="0"/>
+                                        </a:rPr>
+                                        <m:t>(</m:t>
+                                      </m:r>
+                                      <m:sSup>
+                                        <m:sSupPr>
+                                          <m:ctrlPr>
+                                            <a:rPr lang="en-US" sz="2400" b="0" i="1" smtClean="0">
+                                              <a:latin typeface="Cambria Math" panose="02040503050406030204" pitchFamily="18" charset="0"/>
+                                            </a:rPr>
+                                          </m:ctrlPr>
+                                        </m:sSupPr>
+                                        <m:e>
+                                          <m:r>
+                                            <a:rPr lang="en-US" sz="2400" b="0" i="1" smtClean="0">
+                                              <a:latin typeface="Cambria Math" panose="02040503050406030204" pitchFamily="18" charset="0"/>
+                                              <a:ea typeface="Cambria Math" panose="02040503050406030204" pitchFamily="18" charset="0"/>
+                                            </a:rPr>
+                                            <m:t>𝜃</m:t>
+                                          </m:r>
+                                        </m:e>
+                                        <m:sup>
+                                          <m:r>
+                                            <a:rPr lang="en-US" sz="2400" b="0" i="1" smtClean="0">
+                                              <a:latin typeface="Cambria Math" panose="02040503050406030204" pitchFamily="18" charset="0"/>
+                                            </a:rPr>
+                                            <m:t>𝑇</m:t>
+                                          </m:r>
+                                        </m:sup>
+                                      </m:sSup>
+                                      <m:sSup>
+                                        <m:sSupPr>
+                                          <m:ctrlPr>
+                                            <a:rPr lang="en-US" sz="2400" b="0" i="1" smtClean="0">
+                                              <a:latin typeface="Cambria Math" panose="02040503050406030204" pitchFamily="18" charset="0"/>
+                                            </a:rPr>
+                                          </m:ctrlPr>
+                                        </m:sSupPr>
+                                        <m:e>
+                                          <m:r>
+                                            <a:rPr lang="en-US" sz="2400" b="0" i="1" smtClean="0">
+                                              <a:latin typeface="Cambria Math" panose="02040503050406030204" pitchFamily="18" charset="0"/>
+                                            </a:rPr>
+                                            <m:t>𝑥</m:t>
+                                          </m:r>
+                                        </m:e>
+                                        <m:sup>
+                                          <m:r>
+                                            <a:rPr lang="en-US" sz="2400" b="0" i="1" smtClean="0">
+                                              <a:latin typeface="Cambria Math" panose="02040503050406030204" pitchFamily="18" charset="0"/>
+                                            </a:rPr>
+                                            <m:t>(</m:t>
+                                          </m:r>
+                                          <m:r>
+                                            <a:rPr lang="en-US" sz="2400" b="0" i="1" smtClean="0">
+                                              <a:latin typeface="Cambria Math" panose="02040503050406030204" pitchFamily="18" charset="0"/>
+                                            </a:rPr>
+                                            <m:t>𝑖</m:t>
+                                          </m:r>
+                                          <m:r>
+                                            <a:rPr lang="en-US" sz="2400" b="0" i="1" smtClean="0">
+                                              <a:latin typeface="Cambria Math" panose="02040503050406030204" pitchFamily="18" charset="0"/>
+                                            </a:rPr>
+                                            <m:t>)</m:t>
+                                          </m:r>
+                                        </m:sup>
+                                      </m:sSup>
+                                      <m:r>
+                                        <a:rPr lang="en-US" sz="2400" b="0" i="1" smtClean="0">
+                                          <a:latin typeface="Cambria Math" panose="02040503050406030204" pitchFamily="18" charset="0"/>
+                                        </a:rPr>
+                                        <m:t>)</m:t>
+                                      </m:r>
+                                    </m:e>
+                                  </m:func>
+                                </m:e>
+                              </m:d>
+                            </m:e>
+                          </m:nary>
+                          <m:r>
+                            <a:rPr lang="en-US" sz="2400" b="0" i="1" smtClean="0">
+                              <a:latin typeface="Cambria Math" panose="02040503050406030204" pitchFamily="18" charset="0"/>
+                            </a:rPr>
+                            <m:t>+ </m:t>
+                          </m:r>
+                          <m:f>
+                            <m:fPr>
+                              <m:ctrlPr>
+                                <a:rPr lang="en-US" sz="2400" b="0" i="1" smtClean="0">
+                                  <a:latin typeface="Cambria Math" panose="02040503050406030204" pitchFamily="18" charset="0"/>
+                                </a:rPr>
+                              </m:ctrlPr>
+                            </m:fPr>
+                            <m:num>
+                              <m:r>
+                                <a:rPr lang="en-US" sz="2400" b="0" i="1" smtClean="0">
+                                  <a:latin typeface="Cambria Math" panose="02040503050406030204" pitchFamily="18" charset="0"/>
+                                </a:rPr>
+                                <m:t>1</m:t>
+                              </m:r>
+                            </m:num>
+                            <m:den>
+                              <m:r>
+                                <a:rPr lang="en-US" sz="2400" b="0" i="1" smtClean="0">
+                                  <a:latin typeface="Cambria Math" panose="02040503050406030204" pitchFamily="18" charset="0"/>
+                                </a:rPr>
+                                <m:t>2</m:t>
+                              </m:r>
+                            </m:den>
+                          </m:f>
+                          <m:nary>
+                            <m:naryPr>
+                              <m:chr m:val="∑"/>
+                              <m:ctrlPr>
+                                <a:rPr lang="en-US" sz="2400" b="0" i="1" smtClean="0">
+                                  <a:latin typeface="Cambria Math" panose="02040503050406030204" pitchFamily="18" charset="0"/>
+                                </a:rPr>
+                              </m:ctrlPr>
+                            </m:naryPr>
+                            <m:sub>
+                              <m:r>
+                                <m:rPr>
+                                  <m:brk m:alnAt="23"/>
+                                </m:rPr>
+                                <a:rPr lang="en-US" sz="2400" b="0" i="1" smtClean="0">
+                                  <a:latin typeface="Cambria Math" panose="02040503050406030204" pitchFamily="18" charset="0"/>
+                                </a:rPr>
+                                <m:t>𝑗</m:t>
+                              </m:r>
+                              <m:r>
+                                <a:rPr lang="en-US" sz="2400" b="0" i="1" smtClean="0">
+                                  <a:latin typeface="Cambria Math" panose="02040503050406030204" pitchFamily="18" charset="0"/>
+                                </a:rPr>
+                                <m:t>=1</m:t>
+                              </m:r>
+                            </m:sub>
+                            <m:sup>
+                              <m:r>
+                                <a:rPr lang="en-US" sz="2400" b="0" i="1" smtClean="0">
+                                  <a:latin typeface="Cambria Math" panose="02040503050406030204" pitchFamily="18" charset="0"/>
+                                </a:rPr>
+                                <m:t>𝑛</m:t>
+                              </m:r>
+                            </m:sup>
+                            <m:e>
+                              <m:sSubSup>
+                                <m:sSubSupPr>
+                                  <m:ctrlPr>
+                                    <a:rPr lang="en-US" sz="2400" b="0" i="1" smtClean="0">
+                                      <a:latin typeface="Cambria Math" panose="02040503050406030204" pitchFamily="18" charset="0"/>
+                                    </a:rPr>
+                                  </m:ctrlPr>
+                                </m:sSubSupPr>
+                                <m:e>
+                                  <m:r>
+                                    <a:rPr lang="en-US" sz="2400" b="0" i="1" smtClean="0">
+                                      <a:latin typeface="Cambria Math" panose="02040503050406030204" pitchFamily="18" charset="0"/>
+                                      <a:ea typeface="Cambria Math" panose="02040503050406030204" pitchFamily="18" charset="0"/>
+                                    </a:rPr>
+                                    <m:t>𝜃</m:t>
+                                  </m:r>
+                                </m:e>
+                                <m:sub>
+                                  <m:r>
+                                    <a:rPr lang="en-US" sz="2400" b="0" i="1" smtClean="0">
+                                      <a:latin typeface="Cambria Math" panose="02040503050406030204" pitchFamily="18" charset="0"/>
+                                    </a:rPr>
+                                    <m:t>𝑗</m:t>
+                                  </m:r>
+                                </m:sub>
+                                <m:sup>
+                                  <m:r>
+                                    <a:rPr lang="en-US" sz="2400" b="0" i="1" smtClean="0">
+                                      <a:latin typeface="Cambria Math" panose="02040503050406030204" pitchFamily="18" charset="0"/>
+                                    </a:rPr>
+                                    <m:t>2</m:t>
+                                  </m:r>
+                                </m:sup>
+                              </m:sSubSup>
+                            </m:e>
+                          </m:nary>
+                        </m:e>
+                      </m:func>
+                    </m:oMath>
+                  </m:oMathPara>
+                </a14:m>
+                <a:endParaRPr lang="en-US" sz="2400" dirty="0"/>
+              </a:p>
+            </p:txBody>
+          </p:sp>
+        </mc:Choice>
+        <mc:Fallback>
+          <p:sp>
+            <p:nvSpPr>
+              <p:cNvPr id="5" name="TextBox 4">
+                <a:extLst>
+                  <a:ext uri="{FF2B5EF4-FFF2-40B4-BE49-F238E27FC236}">
+                    <a16:creationId xmlns:a16="http://schemas.microsoft.com/office/drawing/2014/main" id="{D7FC0AF6-8425-6342-8667-166510783B83}"/>
+                  </a:ext>
+                </a:extLst>
+              </p:cNvPr>
+              <p:cNvSpPr txBox="1">
+                <a:spLocks noRot="1" noChangeAspect="1" noMove="1" noResize="1" noEditPoints="1" noAdjustHandles="1" noChangeArrowheads="1" noChangeShapeType="1" noTextEdit="1"/>
+              </p:cNvSpPr>
+              <p:nvPr/>
+            </p:nvSpPr>
+            <p:spPr>
+              <a:xfrm>
+                <a:off x="1122665" y="2484339"/>
+                <a:ext cx="9202263" cy="1050031"/>
+              </a:xfrm>
+              <a:prstGeom prst="rect">
+                <a:avLst/>
+              </a:prstGeom>
+              <a:blipFill>
+                <a:blip r:embed="rId3"/>
+                <a:stretch>
+                  <a:fillRect l="-2479" t="-116867" r="-2893" b="-171084"/>
+                </a:stretch>
+              </a:blipFill>
+            </p:spPr>
+            <p:txBody>
+              <a:bodyPr/>
+              <a:lstStyle/>
+              <a:p>
+                <a:r>
+                  <a:rPr lang="en-US">
+                    <a:noFill/>
+                  </a:rPr>
+                  <a:t> </a:t>
+                </a:r>
+              </a:p>
+            </p:txBody>
+          </p:sp>
+        </mc:Fallback>
+      </mc:AlternateContent>
+    </p:spTree>
+    <p:extLst>
+      <p:ext uri="{BB962C8B-B14F-4D97-AF65-F5344CB8AC3E}">
+        <p14:creationId xmlns:p14="http://schemas.microsoft.com/office/powerpoint/2010/main" val="2872645170"/>
+      </p:ext>
+    </p:extLst>
+  </p:cSld>
+  <p:clrMapOvr>
+    <a:masterClrMapping/>
+  </p:clrMapOvr>
+</p:sld>
+</file>
+
+<file path=ppt/slides/slide7.xml><?xml version="1.0" encoding="utf-8"?>
+<p:sld xmlns:a="http://schemas.openxmlformats.org/drawingml/2006/main" xmlns:r="http://schemas.openxmlformats.org/officeDocument/2006/relationships" xmlns:p="http://schemas.openxmlformats.org/presentationml/2006/main">
+  <p:cSld>
+    <p:spTree>
+      <p:nvGrpSpPr>
+        <p:cNvPr id="1" name=""/>
+        <p:cNvGrpSpPr/>
+        <p:nvPr/>
+      </p:nvGrpSpPr>
+      <p:grpSpPr>
+        <a:xfrm>
+          <a:off x="0" y="0"/>
+          <a:ext cx="0" cy="0"/>
+          <a:chOff x="0" y="0"/>
+          <a:chExt cx="0" cy="0"/>
+        </a:xfrm>
+      </p:grpSpPr>
+      <p:sp>
+        <p:nvSpPr>
+          <p:cNvPr id="2" name="Title 1">
+            <a:extLst>
+              <a:ext uri="{FF2B5EF4-FFF2-40B4-BE49-F238E27FC236}">
                 <a16:creationId xmlns:a16="http://schemas.microsoft.com/office/drawing/2014/main" id="{464E5AE7-6A75-6047-ABAF-3085AFDF0FFB}"/>
               </a:ext>
             </a:extLst>
@@ -6575,7 +7625,7 @@
 </p:sld>
 </file>
 
-<file path=ppt/slides/slide7.xml><?xml version="1.0" encoding="utf-8"?>
+<file path=ppt/slides/slide8.xml><?xml version="1.0" encoding="utf-8"?>
 <p:sld xmlns:a="http://schemas.openxmlformats.org/drawingml/2006/main" xmlns:r="http://schemas.openxmlformats.org/officeDocument/2006/relationships" xmlns:p="http://schemas.openxmlformats.org/presentationml/2006/main">
   <p:cSld>
     <p:spTree>
@@ -6696,172 +7746,6 @@
 </p:sld>
 </file>
 
-<file path=ppt/slides/slide8.xml><?xml version="1.0" encoding="utf-8"?>
-<p:sld xmlns:a="http://schemas.openxmlformats.org/drawingml/2006/main" xmlns:r="http://schemas.openxmlformats.org/officeDocument/2006/relationships" xmlns:p="http://schemas.openxmlformats.org/presentationml/2006/main">
-  <p:cSld>
-    <p:spTree>
-      <p:nvGrpSpPr>
-        <p:cNvPr id="1" name=""/>
-        <p:cNvGrpSpPr/>
-        <p:nvPr/>
-      </p:nvGrpSpPr>
-      <p:grpSpPr>
-        <a:xfrm>
-          <a:off x="0" y="0"/>
-          <a:ext cx="0" cy="0"/>
-          <a:chOff x="0" y="0"/>
-          <a:chExt cx="0" cy="0"/>
-        </a:xfrm>
-      </p:grpSpPr>
-      <p:sp>
-        <p:nvSpPr>
-          <p:cNvPr id="2" name="Title 1">
-            <a:extLst>
-              <a:ext uri="{FF2B5EF4-FFF2-40B4-BE49-F238E27FC236}">
-                <a16:creationId xmlns:a16="http://schemas.microsoft.com/office/drawing/2014/main" id="{D845298B-67C1-8A47-A542-74016DAC8A81}"/>
-              </a:ext>
-            </a:extLst>
-          </p:cNvPr>
-          <p:cNvSpPr>
-            <a:spLocks noGrp="1"/>
-          </p:cNvSpPr>
-          <p:nvPr>
-            <p:ph type="title"/>
-          </p:nvPr>
-        </p:nvSpPr>
-        <p:spPr>
-          <a:xfrm>
-            <a:off x="838200" y="365125"/>
-            <a:ext cx="10515600" cy="1325563"/>
-          </a:xfrm>
-        </p:spPr>
-        <p:txBody>
-          <a:bodyPr>
-            <a:normAutofit fontScale="90000"/>
-          </a:bodyPr>
-          <a:lstStyle/>
-          <a:p>
-            <a:br>
-              <a:rPr lang="en-US" sz="2700" dirty="0"/>
-            </a:br>
-            <a:br>
-              <a:rPr lang="en-US" sz="2700" dirty="0"/>
-            </a:br>
-            <a:br>
-              <a:rPr lang="en-US" sz="2700" dirty="0"/>
-            </a:br>
-            <a:r>
-              <a:rPr lang="en-US" sz="2700" dirty="0" err="1"/>
-              <a:t>Qual</a:t>
-            </a:r>
-            <a:r>
-              <a:rPr lang="en-US" sz="2700" dirty="0"/>
-              <a:t> o </a:t>
-            </a:r>
-            <a:r>
-              <a:rPr lang="en-US" sz="2700" dirty="0" err="1"/>
-              <a:t>problema</a:t>
-            </a:r>
-            <a:r>
-              <a:rPr lang="en-US" sz="2700" dirty="0"/>
-              <a:t> da </a:t>
-            </a:r>
-            <a:r>
-              <a:rPr lang="en-US" sz="2700" dirty="0" err="1"/>
-              <a:t>maximização</a:t>
-            </a:r>
-            <a:r>
-              <a:rPr lang="en-US" sz="2700" dirty="0"/>
-              <a:t> da </a:t>
-            </a:r>
-            <a:r>
-              <a:rPr lang="en-US" sz="2700" dirty="0" err="1"/>
-              <a:t>margem</a:t>
-            </a:r>
-            <a:r>
-              <a:rPr lang="en-US" sz="2700" dirty="0"/>
-              <a:t>? O que </a:t>
-            </a:r>
-            <a:r>
-              <a:rPr lang="en-US" sz="2700" dirty="0" err="1"/>
-              <a:t>acontece</a:t>
-            </a:r>
-            <a:r>
-              <a:rPr lang="en-US" sz="2700" dirty="0"/>
-              <a:t> </a:t>
-            </a:r>
-            <a:r>
-              <a:rPr lang="en-US" sz="2700" dirty="0" err="1"/>
-              <a:t>quando</a:t>
-            </a:r>
-            <a:r>
-              <a:rPr lang="en-US" sz="2700" dirty="0"/>
-              <a:t> </a:t>
-            </a:r>
-            <a:r>
-              <a:rPr lang="en-US" sz="2700" dirty="0" err="1"/>
-              <a:t>insere</a:t>
-            </a:r>
-            <a:r>
-              <a:rPr lang="en-US" sz="2700" dirty="0"/>
-              <a:t> um </a:t>
-            </a:r>
-            <a:r>
-              <a:rPr lang="en-US" sz="2700" dirty="0" err="1"/>
-              <a:t>ponto</a:t>
-            </a:r>
-            <a:r>
-              <a:rPr lang="en-US" sz="2700" dirty="0"/>
-              <a:t> novo? Outliers?</a:t>
-            </a:r>
-            <a:br>
-              <a:rPr lang="en-US" dirty="0"/>
-            </a:br>
-            <a:br>
-              <a:rPr lang="en-US" dirty="0"/>
-            </a:br>
-            <a:endParaRPr lang="en-US" dirty="0"/>
-          </a:p>
-        </p:txBody>
-      </p:sp>
-      <p:sp>
-        <p:nvSpPr>
-          <p:cNvPr id="3" name="Content Placeholder 2">
-            <a:extLst>
-              <a:ext uri="{FF2B5EF4-FFF2-40B4-BE49-F238E27FC236}">
-                <a16:creationId xmlns:a16="http://schemas.microsoft.com/office/drawing/2014/main" id="{CCD07A63-87EB-3B4A-A861-E95C082B9E42}"/>
-              </a:ext>
-            </a:extLst>
-          </p:cNvPr>
-          <p:cNvSpPr>
-            <a:spLocks noGrp="1"/>
-          </p:cNvSpPr>
-          <p:nvPr>
-            <p:ph idx="1"/>
-          </p:nvPr>
-        </p:nvSpPr>
-        <p:spPr/>
-        <p:txBody>
-          <a:bodyPr/>
-          <a:lstStyle/>
-          <a:p>
-            <a:endParaRPr lang="en-US"/>
-          </a:p>
-        </p:txBody>
-      </p:sp>
-    </p:spTree>
-    <p:extLst>
-      <p:ext uri="{BB962C8B-B14F-4D97-AF65-F5344CB8AC3E}">
-        <p14:creationId xmlns:p14="http://schemas.microsoft.com/office/powerpoint/2010/main" val="386183098"/>
-      </p:ext>
-    </p:extLst>
-  </p:cSld>
-  <p:clrMapOvr>
-    <a:masterClrMapping/>
-  </p:clrMapOvr>
-</p:sld>
-</file>
-
 <file path=ppt/slides/slide9.xml><?xml version="1.0" encoding="utf-8"?>
 <p:sld xmlns:a="http://schemas.openxmlformats.org/drawingml/2006/main" xmlns:r="http://schemas.openxmlformats.org/officeDocument/2006/relationships" xmlns:p="http://schemas.openxmlformats.org/presentationml/2006/main">
   <p:cSld>
@@ -6884,7 +7768,7 @@
           <p:cNvPr id="2" name="Title 1">
             <a:extLst>
               <a:ext uri="{FF2B5EF4-FFF2-40B4-BE49-F238E27FC236}">
-                <a16:creationId xmlns:a16="http://schemas.microsoft.com/office/drawing/2014/main" id="{8E094BEA-C5E1-4345-B805-A1ADFC0F5B56}"/>
+                <a16:creationId xmlns:a16="http://schemas.microsoft.com/office/drawing/2014/main" id="{D845298B-67C1-8A47-A542-74016DAC8A81}"/>
               </a:ext>
             </a:extLst>
           </p:cNvPr>
@@ -6895,91 +7779,130 @@
             <p:ph type="title"/>
           </p:nvPr>
         </p:nvSpPr>
+        <p:spPr>
+          <a:xfrm>
+            <a:off x="838200" y="365125"/>
+            <a:ext cx="10515600" cy="1325563"/>
+          </a:xfrm>
+        </p:spPr>
+        <p:txBody>
+          <a:bodyPr>
+            <a:normAutofit fontScale="90000"/>
+          </a:bodyPr>
+          <a:lstStyle/>
+          <a:p>
+            <a:br>
+              <a:rPr lang="en-US" sz="2700" dirty="0"/>
+            </a:br>
+            <a:br>
+              <a:rPr lang="en-US" sz="2700" dirty="0"/>
+            </a:br>
+            <a:br>
+              <a:rPr lang="en-US" sz="2700" dirty="0"/>
+            </a:br>
+            <a:r>
+              <a:rPr lang="en-US" sz="2700" dirty="0" err="1"/>
+              <a:t>Qual</a:t>
+            </a:r>
+            <a:r>
+              <a:rPr lang="en-US" sz="2700" dirty="0"/>
+              <a:t> o </a:t>
+            </a:r>
+            <a:r>
+              <a:rPr lang="en-US" sz="2700" dirty="0" err="1"/>
+              <a:t>problema</a:t>
+            </a:r>
+            <a:r>
+              <a:rPr lang="en-US" sz="2700" dirty="0"/>
+              <a:t> da </a:t>
+            </a:r>
+            <a:r>
+              <a:rPr lang="en-US" sz="2700" dirty="0" err="1"/>
+              <a:t>maximização</a:t>
+            </a:r>
+            <a:r>
+              <a:rPr lang="en-US" sz="2700" dirty="0"/>
+              <a:t> da </a:t>
+            </a:r>
+            <a:r>
+              <a:rPr lang="en-US" sz="2700" dirty="0" err="1"/>
+              <a:t>margem</a:t>
+            </a:r>
+            <a:r>
+              <a:rPr lang="en-US" sz="2700" dirty="0"/>
+              <a:t>? O que </a:t>
+            </a:r>
+            <a:r>
+              <a:rPr lang="en-US" sz="2700" dirty="0" err="1"/>
+              <a:t>acontece</a:t>
+            </a:r>
+            <a:r>
+              <a:rPr lang="en-US" sz="2700" dirty="0"/>
+              <a:t> </a:t>
+            </a:r>
+            <a:r>
+              <a:rPr lang="en-US" sz="2700" dirty="0" err="1"/>
+              <a:t>quando</a:t>
+            </a:r>
+            <a:r>
+              <a:rPr lang="en-US" sz="2700" dirty="0"/>
+              <a:t> </a:t>
+            </a:r>
+            <a:r>
+              <a:rPr lang="en-US" sz="2700" dirty="0" err="1"/>
+              <a:t>insere</a:t>
+            </a:r>
+            <a:r>
+              <a:rPr lang="en-US" sz="2700" dirty="0"/>
+              <a:t> um </a:t>
+            </a:r>
+            <a:r>
+              <a:rPr lang="en-US" sz="2700" dirty="0" err="1"/>
+              <a:t>ponto</a:t>
+            </a:r>
+            <a:r>
+              <a:rPr lang="en-US" sz="2700" dirty="0"/>
+              <a:t> novo? Outliers?</a:t>
+            </a:r>
+            <a:br>
+              <a:rPr lang="en-US" dirty="0"/>
+            </a:br>
+            <a:br>
+              <a:rPr lang="en-US" dirty="0"/>
+            </a:br>
+            <a:endParaRPr lang="en-US" dirty="0"/>
+          </a:p>
+        </p:txBody>
+      </p:sp>
+      <p:sp>
+        <p:nvSpPr>
+          <p:cNvPr id="3" name="Content Placeholder 2">
+            <a:extLst>
+              <a:ext uri="{FF2B5EF4-FFF2-40B4-BE49-F238E27FC236}">
+                <a16:creationId xmlns:a16="http://schemas.microsoft.com/office/drawing/2014/main" id="{CCD07A63-87EB-3B4A-A861-E95C082B9E42}"/>
+              </a:ext>
+            </a:extLst>
+          </p:cNvPr>
+          <p:cNvSpPr>
+            <a:spLocks noGrp="1"/>
+          </p:cNvSpPr>
+          <p:nvPr>
+            <p:ph idx="1"/>
+          </p:nvPr>
+        </p:nvSpPr>
         <p:spPr/>
         <p:txBody>
           <a:bodyPr/>
           <a:lstStyle/>
           <a:p>
-            <a:r>
-              <a:rPr lang="en-US" dirty="0"/>
-              <a:t>O que </a:t>
-            </a:r>
-            <a:r>
-              <a:rPr lang="en-US" dirty="0" err="1"/>
-              <a:t>é</a:t>
-            </a:r>
-            <a:r>
-              <a:rPr lang="en-US" dirty="0"/>
-              <a:t> soft margin? </a:t>
-            </a:r>
-            <a:r>
-              <a:rPr lang="en-US" dirty="0" err="1"/>
-              <a:t>Por</a:t>
-            </a:r>
-            <a:r>
-              <a:rPr lang="en-US" dirty="0"/>
-              <a:t> que </a:t>
-            </a:r>
-            <a:r>
-              <a:rPr lang="en-US" dirty="0" err="1"/>
-              <a:t>ele</a:t>
-            </a:r>
-            <a:r>
-              <a:rPr lang="en-US" dirty="0"/>
-              <a:t> </a:t>
-            </a:r>
-            <a:r>
-              <a:rPr lang="en-US" dirty="0" err="1"/>
-              <a:t>foi</a:t>
-            </a:r>
-            <a:r>
-              <a:rPr lang="en-US" dirty="0"/>
-              <a:t> </a:t>
-            </a:r>
-            <a:r>
-              <a:rPr lang="en-US" dirty="0" err="1"/>
-              <a:t>criado</a:t>
-            </a:r>
-            <a:r>
-              <a:rPr lang="en-US" dirty="0"/>
-              <a:t>?</a:t>
-            </a:r>
-          </a:p>
-        </p:txBody>
-      </p:sp>
-      <p:pic>
-        <p:nvPicPr>
-          <p:cNvPr id="5" name="Content Placeholder 4">
-            <a:extLst>
-              <a:ext uri="{FF2B5EF4-FFF2-40B4-BE49-F238E27FC236}">
-                <a16:creationId xmlns:a16="http://schemas.microsoft.com/office/drawing/2014/main" id="{5BDD7081-1B0A-0543-B27A-AECBB3842C5D}"/>
-              </a:ext>
-            </a:extLst>
-          </p:cNvPr>
-          <p:cNvPicPr>
-            <a:picLocks noGrp="1" noChangeAspect="1"/>
-          </p:cNvPicPr>
-          <p:nvPr>
-            <p:ph idx="1"/>
-          </p:nvPr>
-        </p:nvPicPr>
-        <p:blipFill>
-          <a:blip r:embed="rId2"/>
-          <a:stretch>
-            <a:fillRect/>
-          </a:stretch>
-        </p:blipFill>
-        <p:spPr>
-          <a:xfrm>
-            <a:off x="2504904" y="1562154"/>
-            <a:ext cx="5756348" cy="4351338"/>
-          </a:xfrm>
-        </p:spPr>
-      </p:pic>
+            <a:endParaRPr lang="en-US"/>
+          </a:p>
+        </p:txBody>
+      </p:sp>
     </p:spTree>
     <p:extLst>
       <p:ext uri="{BB962C8B-B14F-4D97-AF65-F5344CB8AC3E}">
-        <p14:creationId xmlns:p14="http://schemas.microsoft.com/office/powerpoint/2010/main" val="1917038832"/>
+        <p14:creationId xmlns:p14="http://schemas.microsoft.com/office/powerpoint/2010/main" val="386183098"/>
       </p:ext>
     </p:extLst>
   </p:cSld>

</xml_diff>